<commit_message>
remove icedqlib, syscalls + edit architecture image
</commit_message>
<xml_diff>
--- a/docs/IcedCoffee architecture.pptx
+++ b/docs/IcedCoffee architecture.pptx
@@ -259,7 +259,7 @@
           <a:p>
             <a:fld id="{666A05BA-B2BC-4940-BA4D-309304EB5825}" type="datetimeFigureOut">
               <a:rPr lang="en-US" smtClean="0"/>
-              <a:t>10/17/2020</a:t>
+              <a:t>10/17/2021</a:t>
             </a:fld>
             <a:endParaRPr lang="en-US"/>
           </a:p>
@@ -457,7 +457,7 @@
           <a:p>
             <a:fld id="{666A05BA-B2BC-4940-BA4D-309304EB5825}" type="datetimeFigureOut">
               <a:rPr lang="en-US" smtClean="0"/>
-              <a:t>10/17/2020</a:t>
+              <a:t>10/17/2021</a:t>
             </a:fld>
             <a:endParaRPr lang="en-US"/>
           </a:p>
@@ -665,7 +665,7 @@
           <a:p>
             <a:fld id="{666A05BA-B2BC-4940-BA4D-309304EB5825}" type="datetimeFigureOut">
               <a:rPr lang="en-US" smtClean="0"/>
-              <a:t>10/17/2020</a:t>
+              <a:t>10/17/2021</a:t>
             </a:fld>
             <a:endParaRPr lang="en-US"/>
           </a:p>
@@ -863,7 +863,7 @@
           <a:p>
             <a:fld id="{666A05BA-B2BC-4940-BA4D-309304EB5825}" type="datetimeFigureOut">
               <a:rPr lang="en-US" smtClean="0"/>
-              <a:t>10/17/2020</a:t>
+              <a:t>10/17/2021</a:t>
             </a:fld>
             <a:endParaRPr lang="en-US"/>
           </a:p>
@@ -1138,7 +1138,7 @@
           <a:p>
             <a:fld id="{666A05BA-B2BC-4940-BA4D-309304EB5825}" type="datetimeFigureOut">
               <a:rPr lang="en-US" smtClean="0"/>
-              <a:t>10/17/2020</a:t>
+              <a:t>10/17/2021</a:t>
             </a:fld>
             <a:endParaRPr lang="en-US"/>
           </a:p>
@@ -1403,7 +1403,7 @@
           <a:p>
             <a:fld id="{666A05BA-B2BC-4940-BA4D-309304EB5825}" type="datetimeFigureOut">
               <a:rPr lang="en-US" smtClean="0"/>
-              <a:t>10/17/2020</a:t>
+              <a:t>10/17/2021</a:t>
             </a:fld>
             <a:endParaRPr lang="en-US"/>
           </a:p>
@@ -1815,7 +1815,7 @@
           <a:p>
             <a:fld id="{666A05BA-B2BC-4940-BA4D-309304EB5825}" type="datetimeFigureOut">
               <a:rPr lang="en-US" smtClean="0"/>
-              <a:t>10/17/2020</a:t>
+              <a:t>10/17/2021</a:t>
             </a:fld>
             <a:endParaRPr lang="en-US"/>
           </a:p>
@@ -1956,7 +1956,7 @@
           <a:p>
             <a:fld id="{666A05BA-B2BC-4940-BA4D-309304EB5825}" type="datetimeFigureOut">
               <a:rPr lang="en-US" smtClean="0"/>
-              <a:t>10/17/2020</a:t>
+              <a:t>10/17/2021</a:t>
             </a:fld>
             <a:endParaRPr lang="en-US"/>
           </a:p>
@@ -2069,7 +2069,7 @@
           <a:p>
             <a:fld id="{666A05BA-B2BC-4940-BA4D-309304EB5825}" type="datetimeFigureOut">
               <a:rPr lang="en-US" smtClean="0"/>
-              <a:t>10/17/2020</a:t>
+              <a:t>10/17/2021</a:t>
             </a:fld>
             <a:endParaRPr lang="en-US"/>
           </a:p>
@@ -2380,7 +2380,7 @@
           <a:p>
             <a:fld id="{666A05BA-B2BC-4940-BA4D-309304EB5825}" type="datetimeFigureOut">
               <a:rPr lang="en-US" smtClean="0"/>
-              <a:t>10/17/2020</a:t>
+              <a:t>10/17/2021</a:t>
             </a:fld>
             <a:endParaRPr lang="en-US"/>
           </a:p>
@@ -2668,7 +2668,7 @@
           <a:p>
             <a:fld id="{666A05BA-B2BC-4940-BA4D-309304EB5825}" type="datetimeFigureOut">
               <a:rPr lang="en-US" smtClean="0"/>
-              <a:t>10/17/2020</a:t>
+              <a:t>10/17/2021</a:t>
             </a:fld>
             <a:endParaRPr lang="en-US"/>
           </a:p>
@@ -2909,7 +2909,7 @@
           <a:p>
             <a:fld id="{666A05BA-B2BC-4940-BA4D-309304EB5825}" type="datetimeFigureOut">
               <a:rPr lang="en-US" smtClean="0"/>
-              <a:t>10/17/2020</a:t>
+              <a:t>10/17/2021</a:t>
             </a:fld>
             <a:endParaRPr lang="en-US"/>
           </a:p>
@@ -3405,8 +3405,8 @@
         </p:nvSpPr>
         <p:spPr>
           <a:xfrm>
-            <a:off x="1729451" y="3084570"/>
-            <a:ext cx="3669127" cy="2132741"/>
+            <a:off x="1742365" y="2577603"/>
+            <a:ext cx="3669127" cy="2639710"/>
           </a:xfrm>
           <a:prstGeom prst="rect">
             <a:avLst/>
@@ -3495,10 +3495,10 @@
       </p:sp>
       <p:sp>
         <p:nvSpPr>
-          <p:cNvPr id="21" name="Rectangle 20">
-            <a:extLst>
-              <a:ext uri="{FF2B5EF4-FFF2-40B4-BE49-F238E27FC236}">
-                <a16:creationId xmlns:a16="http://schemas.microsoft.com/office/drawing/2014/main" id="{9B603954-3504-4F62-89DF-A9EF58B95018}"/>
+          <p:cNvPr id="24" name="Rectangle 23">
+            <a:extLst>
+              <a:ext uri="{FF2B5EF4-FFF2-40B4-BE49-F238E27FC236}">
+                <a16:creationId xmlns:a16="http://schemas.microsoft.com/office/drawing/2014/main" id="{7560B97B-C649-4899-8F74-065C9B052B88}"/>
               </a:ext>
             </a:extLst>
           </p:cNvPr>
@@ -3507,85 +3507,16 @@
         </p:nvSpPr>
         <p:spPr>
           <a:xfrm>
-            <a:off x="1863936" y="2740292"/>
-            <a:ext cx="3424202" cy="261746"/>
+            <a:off x="1897851" y="3422827"/>
+            <a:ext cx="605328" cy="510648"/>
           </a:xfrm>
           <a:prstGeom prst="rect">
             <a:avLst/>
           </a:prstGeom>
           <a:solidFill>
             <a:schemeClr val="accent6">
-              <a:lumMod val="20000"/>
-              <a:lumOff val="80000"/>
-            </a:schemeClr>
-          </a:solidFill>
-          <a:ln w="28575">
-            <a:solidFill>
-              <a:schemeClr val="accent6">
-                <a:lumMod val="60000"/>
-                <a:lumOff val="40000"/>
-              </a:schemeClr>
-            </a:solidFill>
-          </a:ln>
-        </p:spPr>
-        <p:style>
-          <a:lnRef idx="2">
-            <a:schemeClr val="accent1">
-              <a:shade val="50000"/>
-            </a:schemeClr>
-          </a:lnRef>
-          <a:fillRef idx="1">
-            <a:schemeClr val="accent1"/>
-          </a:fillRef>
-          <a:effectRef idx="0">
-            <a:schemeClr val="accent1"/>
-          </a:effectRef>
-          <a:fontRef idx="minor">
-            <a:schemeClr val="lt1"/>
-          </a:fontRef>
-        </p:style>
-        <p:txBody>
-          <a:bodyPr rtlCol="0" anchor="ctr"/>
-          <a:lstStyle/>
-          <a:p>
-            <a:pPr algn="ctr"/>
-            <a:r>
-              <a:rPr lang="en-CA" sz="1600" b="1" dirty="0">
-                <a:solidFill>
-                  <a:schemeClr val="accent5">
-                    <a:lumMod val="75000"/>
-                  </a:schemeClr>
-                </a:solidFill>
-              </a:rPr>
-              <a:t>IcedQlib</a:t>
-            </a:r>
-          </a:p>
-        </p:txBody>
-      </p:sp>
-      <p:sp>
-        <p:nvSpPr>
-          <p:cNvPr id="24" name="Rectangle 23">
-            <a:extLst>
-              <a:ext uri="{FF2B5EF4-FFF2-40B4-BE49-F238E27FC236}">
-                <a16:creationId xmlns:a16="http://schemas.microsoft.com/office/drawing/2014/main" id="{7560B97B-C649-4899-8F74-065C9B052B88}"/>
-              </a:ext>
-            </a:extLst>
-          </p:cNvPr>
-          <p:cNvSpPr/>
-          <p:nvPr/>
-        </p:nvSpPr>
-        <p:spPr>
-          <a:xfrm>
-            <a:off x="2274835" y="3613409"/>
-            <a:ext cx="686327" cy="311273"/>
-          </a:xfrm>
-          <a:prstGeom prst="rect">
-            <a:avLst/>
-          </a:prstGeom>
-          <a:solidFill>
-            <a:schemeClr val="accent6">
-              <a:lumMod val="20000"/>
-              <a:lumOff val="80000"/>
+              <a:lumMod val="40000"/>
+              <a:lumOff val="60000"/>
             </a:schemeClr>
           </a:solidFill>
           <a:ln w="28575">
@@ -3646,16 +3577,16 @@
         </p:nvSpPr>
         <p:spPr>
           <a:xfrm>
-            <a:off x="4036657" y="3606327"/>
-            <a:ext cx="937189" cy="304012"/>
+            <a:off x="3430740" y="3439160"/>
+            <a:ext cx="1166319" cy="265456"/>
           </a:xfrm>
           <a:prstGeom prst="rect">
             <a:avLst/>
           </a:prstGeom>
           <a:solidFill>
             <a:schemeClr val="accent6">
-              <a:lumMod val="20000"/>
-              <a:lumOff val="80000"/>
+              <a:lumMod val="40000"/>
+              <a:lumOff val="60000"/>
             </a:schemeClr>
           </a:solidFill>
           <a:ln w="28575">
@@ -3716,7 +3647,7 @@
         </p:nvSpPr>
         <p:spPr>
           <a:xfrm>
-            <a:off x="2224496" y="2274683"/>
+            <a:off x="2190798" y="1738915"/>
             <a:ext cx="417149" cy="328831"/>
           </a:xfrm>
           <a:prstGeom prst="triangle">
@@ -3762,7 +3693,7 @@
         </p:nvSpPr>
         <p:spPr>
           <a:xfrm rot="10800000">
-            <a:off x="3122230" y="2274683"/>
+            <a:off x="3088532" y="1738915"/>
             <a:ext cx="417149" cy="333111"/>
           </a:xfrm>
           <a:prstGeom prst="triangle">
@@ -3808,7 +3739,7 @@
         </p:nvSpPr>
         <p:spPr>
           <a:xfrm>
-            <a:off x="2679475" y="2245064"/>
+            <a:off x="2645777" y="1709296"/>
             <a:ext cx="376998" cy="388067"/>
           </a:xfrm>
           <a:prstGeom prst="ellipse">
@@ -3842,10 +3773,10 @@
       </p:sp>
       <p:sp>
         <p:nvSpPr>
-          <p:cNvPr id="32" name="Oval 31">
-            <a:extLst>
-              <a:ext uri="{FF2B5EF4-FFF2-40B4-BE49-F238E27FC236}">
-                <a16:creationId xmlns:a16="http://schemas.microsoft.com/office/drawing/2014/main" id="{57DAA7AF-E805-447B-83B8-C12D9964D149}"/>
+          <p:cNvPr id="35" name="Rectangle: Rounded Corners 34">
+            <a:extLst>
+              <a:ext uri="{FF2B5EF4-FFF2-40B4-BE49-F238E27FC236}">
+                <a16:creationId xmlns:a16="http://schemas.microsoft.com/office/drawing/2014/main" id="{B7481A67-7D73-4AEF-9D1C-F8C639C7BF55}"/>
               </a:ext>
             </a:extLst>
           </p:cNvPr>
@@ -3854,53 +3785,7 @@
         </p:nvSpPr>
         <p:spPr>
           <a:xfrm>
-            <a:off x="4102625" y="2215447"/>
-            <a:ext cx="376998" cy="388067"/>
-          </a:xfrm>
-          <a:prstGeom prst="ellipse">
-            <a:avLst/>
-          </a:prstGeom>
-        </p:spPr>
-        <p:style>
-          <a:lnRef idx="2">
-            <a:schemeClr val="accent1">
-              <a:shade val="50000"/>
-            </a:schemeClr>
-          </a:lnRef>
-          <a:fillRef idx="1">
-            <a:schemeClr val="accent1"/>
-          </a:fillRef>
-          <a:effectRef idx="0">
-            <a:schemeClr val="accent1"/>
-          </a:effectRef>
-          <a:fontRef idx="minor">
-            <a:schemeClr val="lt1"/>
-          </a:fontRef>
-        </p:style>
-        <p:txBody>
-          <a:bodyPr rtlCol="0" anchor="ctr"/>
-          <a:lstStyle/>
-          <a:p>
-            <a:pPr algn="ctr"/>
-            <a:endParaRPr lang="en-US"/>
-          </a:p>
-        </p:txBody>
-      </p:sp>
-      <p:sp>
-        <p:nvSpPr>
-          <p:cNvPr id="35" name="Rectangle: Rounded Corners 34">
-            <a:extLst>
-              <a:ext uri="{FF2B5EF4-FFF2-40B4-BE49-F238E27FC236}">
-                <a16:creationId xmlns:a16="http://schemas.microsoft.com/office/drawing/2014/main" id="{B7481A67-7D73-4AEF-9D1C-F8C639C7BF55}"/>
-              </a:ext>
-            </a:extLst>
-          </p:cNvPr>
-          <p:cNvSpPr/>
-          <p:nvPr/>
-        </p:nvSpPr>
-        <p:spPr>
-          <a:xfrm>
-            <a:off x="3657455" y="2245063"/>
+            <a:off x="3623757" y="1709295"/>
             <a:ext cx="376998" cy="388068"/>
           </a:xfrm>
           <a:prstGeom prst="roundRect">
@@ -3934,65 +3819,19 @@
       </p:sp>
       <p:sp>
         <p:nvSpPr>
-          <p:cNvPr id="36" name="Rectangle: Rounded Corners 35">
-            <a:extLst>
-              <a:ext uri="{FF2B5EF4-FFF2-40B4-BE49-F238E27FC236}">
-                <a16:creationId xmlns:a16="http://schemas.microsoft.com/office/drawing/2014/main" id="{27982796-B3B6-4B44-9BA0-19B258B81A23}"/>
-              </a:ext>
-            </a:extLst>
-          </p:cNvPr>
-          <p:cNvSpPr/>
+          <p:cNvPr id="37" name="TextBox 36">
+            <a:extLst>
+              <a:ext uri="{FF2B5EF4-FFF2-40B4-BE49-F238E27FC236}">
+                <a16:creationId xmlns:a16="http://schemas.microsoft.com/office/drawing/2014/main" id="{9BD4F47C-0314-45D0-B6DD-BB763D208502}"/>
+              </a:ext>
+            </a:extLst>
+          </p:cNvPr>
+          <p:cNvSpPr txBox="1"/>
           <p:nvPr/>
         </p:nvSpPr>
         <p:spPr>
           <a:xfrm>
-            <a:off x="4573129" y="2223858"/>
-            <a:ext cx="370569" cy="395887"/>
-          </a:xfrm>
-          <a:prstGeom prst="roundRect">
-            <a:avLst/>
-          </a:prstGeom>
-        </p:spPr>
-        <p:style>
-          <a:lnRef idx="2">
-            <a:schemeClr val="accent1">
-              <a:shade val="50000"/>
-            </a:schemeClr>
-          </a:lnRef>
-          <a:fillRef idx="1">
-            <a:schemeClr val="accent1"/>
-          </a:fillRef>
-          <a:effectRef idx="0">
-            <a:schemeClr val="accent1"/>
-          </a:effectRef>
-          <a:fontRef idx="minor">
-            <a:schemeClr val="lt1"/>
-          </a:fontRef>
-        </p:style>
-        <p:txBody>
-          <a:bodyPr rtlCol="0" anchor="ctr"/>
-          <a:lstStyle/>
-          <a:p>
-            <a:pPr algn="ctr"/>
-            <a:endParaRPr lang="en-US"/>
-          </a:p>
-        </p:txBody>
-      </p:sp>
-      <p:sp>
-        <p:nvSpPr>
-          <p:cNvPr id="37" name="TextBox 36">
-            <a:extLst>
-              <a:ext uri="{FF2B5EF4-FFF2-40B4-BE49-F238E27FC236}">
-                <a16:creationId xmlns:a16="http://schemas.microsoft.com/office/drawing/2014/main" id="{9BD4F47C-0314-45D0-B6DD-BB763D208502}"/>
-              </a:ext>
-            </a:extLst>
-          </p:cNvPr>
-          <p:cNvSpPr txBox="1"/>
-          <p:nvPr/>
-        </p:nvSpPr>
-        <p:spPr>
-          <a:xfrm>
-            <a:off x="2542822" y="1511300"/>
+            <a:off x="1908142" y="1025134"/>
             <a:ext cx="2229265" cy="615553"/>
           </a:xfrm>
           <a:prstGeom prst="rect">
@@ -4247,8 +4086,8 @@
           </a:prstGeom>
           <a:solidFill>
             <a:schemeClr val="accent6">
-              <a:lumMod val="20000"/>
-              <a:lumOff val="80000"/>
+              <a:lumMod val="40000"/>
+              <a:lumOff val="60000"/>
             </a:schemeClr>
           </a:solidFill>
           <a:ln w="28575">
@@ -4289,7 +4128,7 @@
                   </a:schemeClr>
                 </a:solidFill>
               </a:rPr>
-              <a:t>mem</a:t>
+              <a:t>radio</a:t>
             </a:r>
           </a:p>
         </p:txBody>
@@ -4557,8 +4396,8 @@
         </p:nvSpPr>
         <p:spPr>
           <a:xfrm>
-            <a:off x="3056062" y="3606755"/>
-            <a:ext cx="898190" cy="304011"/>
+            <a:off x="2560073" y="3422827"/>
+            <a:ext cx="809218" cy="499649"/>
           </a:xfrm>
           <a:prstGeom prst="rect">
             <a:avLst/>
@@ -4608,7 +4447,7 @@
                   </a:schemeClr>
                 </a:solidFill>
               </a:rPr>
-              <a:t>network</a:t>
+              <a:t>trickle network</a:t>
             </a:r>
           </a:p>
         </p:txBody>
@@ -4627,16 +4466,16 @@
         </p:nvSpPr>
         <p:spPr>
           <a:xfrm>
-            <a:off x="1898387" y="3221057"/>
-            <a:ext cx="3404081" cy="286497"/>
+            <a:off x="1901131" y="2722715"/>
+            <a:ext cx="3332411" cy="262827"/>
           </a:xfrm>
           <a:prstGeom prst="rect">
             <a:avLst/>
           </a:prstGeom>
           <a:solidFill>
             <a:schemeClr val="accent6">
-              <a:lumMod val="20000"/>
-              <a:lumOff val="80000"/>
+              <a:lumMod val="40000"/>
+              <a:lumOff val="60000"/>
             </a:schemeClr>
           </a:solidFill>
           <a:ln w="28575">
@@ -4671,7 +4510,7 @@
           <a:p>
             <a:pPr algn="ctr"/>
             <a:r>
-              <a:rPr lang="en-CA" sz="1400" b="1" dirty="0">
+              <a:rPr lang="en-CA" sz="1600" b="1" dirty="0">
                 <a:solidFill>
                   <a:schemeClr val="accent5">
                     <a:lumMod val="75000"/>
@@ -5457,6 +5296,565 @@
           </a:p>
         </p:txBody>
       </p:sp>
+      <p:sp>
+        <p:nvSpPr>
+          <p:cNvPr id="43" name="Rectangle 42">
+            <a:extLst>
+              <a:ext uri="{FF2B5EF4-FFF2-40B4-BE49-F238E27FC236}">
+                <a16:creationId xmlns:a16="http://schemas.microsoft.com/office/drawing/2014/main" id="{B5306C33-3015-476F-BADC-594F491F0465}"/>
+              </a:ext>
+            </a:extLst>
+          </p:cNvPr>
+          <p:cNvSpPr/>
+          <p:nvPr/>
+        </p:nvSpPr>
+        <p:spPr>
+          <a:xfrm>
+            <a:off x="3435444" y="3765594"/>
+            <a:ext cx="1161615" cy="148432"/>
+          </a:xfrm>
+          <a:prstGeom prst="rect">
+            <a:avLst/>
+          </a:prstGeom>
+          <a:solidFill>
+            <a:schemeClr val="accent6">
+              <a:lumMod val="40000"/>
+              <a:lumOff val="60000"/>
+            </a:schemeClr>
+          </a:solidFill>
+          <a:ln w="28575">
+            <a:solidFill>
+              <a:schemeClr val="accent6">
+                <a:lumMod val="60000"/>
+                <a:lumOff val="40000"/>
+              </a:schemeClr>
+            </a:solidFill>
+            <a:prstDash val="solid"/>
+          </a:ln>
+        </p:spPr>
+        <p:style>
+          <a:lnRef idx="2">
+            <a:schemeClr val="accent1">
+              <a:shade val="50000"/>
+            </a:schemeClr>
+          </a:lnRef>
+          <a:fillRef idx="1">
+            <a:schemeClr val="accent1"/>
+          </a:fillRef>
+          <a:effectRef idx="0">
+            <a:schemeClr val="accent1"/>
+          </a:effectRef>
+          <a:fontRef idx="minor">
+            <a:schemeClr val="lt1"/>
+          </a:fontRef>
+        </p:style>
+        <p:txBody>
+          <a:bodyPr rtlCol="0" anchor="ctr"/>
+          <a:lstStyle/>
+          <a:p>
+            <a:pPr algn="ctr"/>
+            <a:r>
+              <a:rPr lang="en-CA" sz="1100" b="1" dirty="0">
+                <a:solidFill>
+                  <a:schemeClr val="accent5">
+                    <a:lumMod val="75000"/>
+                  </a:schemeClr>
+                </a:solidFill>
+              </a:rPr>
+              <a:t>context switcher</a:t>
+            </a:r>
+          </a:p>
+        </p:txBody>
+      </p:sp>
+      <p:sp>
+        <p:nvSpPr>
+          <p:cNvPr id="45" name="Rectangle 44">
+            <a:extLst>
+              <a:ext uri="{FF2B5EF4-FFF2-40B4-BE49-F238E27FC236}">
+                <a16:creationId xmlns:a16="http://schemas.microsoft.com/office/drawing/2014/main" id="{56FF7E92-4891-4A80-9E7F-9ABAC6D302FE}"/>
+              </a:ext>
+            </a:extLst>
+          </p:cNvPr>
+          <p:cNvSpPr/>
+          <p:nvPr/>
+        </p:nvSpPr>
+        <p:spPr>
+          <a:xfrm>
+            <a:off x="1897851" y="3060839"/>
+            <a:ext cx="3342515" cy="296416"/>
+          </a:xfrm>
+          <a:prstGeom prst="rect">
+            <a:avLst/>
+          </a:prstGeom>
+          <a:solidFill>
+            <a:schemeClr val="accent6">
+              <a:lumMod val="40000"/>
+              <a:lumOff val="60000"/>
+            </a:schemeClr>
+          </a:solidFill>
+          <a:ln w="28575">
+            <a:solidFill>
+              <a:schemeClr val="accent6">
+                <a:lumMod val="60000"/>
+                <a:lumOff val="40000"/>
+              </a:schemeClr>
+            </a:solidFill>
+            <a:prstDash val="solid"/>
+          </a:ln>
+        </p:spPr>
+        <p:style>
+          <a:lnRef idx="2">
+            <a:schemeClr val="accent1">
+              <a:shade val="50000"/>
+            </a:schemeClr>
+          </a:lnRef>
+          <a:fillRef idx="1">
+            <a:schemeClr val="accent1"/>
+          </a:fillRef>
+          <a:effectRef idx="0">
+            <a:schemeClr val="accent1"/>
+          </a:effectRef>
+          <a:fontRef idx="minor">
+            <a:schemeClr val="lt1"/>
+          </a:fontRef>
+        </p:style>
+        <p:txBody>
+          <a:bodyPr rtlCol="0" anchor="ctr"/>
+          <a:lstStyle/>
+          <a:p>
+            <a:r>
+              <a:rPr lang="en-CA" sz="1400" b="1" dirty="0">
+                <a:solidFill>
+                  <a:schemeClr val="accent5">
+                    <a:lumMod val="75000"/>
+                  </a:schemeClr>
+                </a:solidFill>
+              </a:rPr>
+              <a:t>    Kernel publishers &amp; subscribers</a:t>
+            </a:r>
+          </a:p>
+        </p:txBody>
+      </p:sp>
+      <p:sp>
+        <p:nvSpPr>
+          <p:cNvPr id="47" name="Rectangle 46">
+            <a:extLst>
+              <a:ext uri="{FF2B5EF4-FFF2-40B4-BE49-F238E27FC236}">
+                <a16:creationId xmlns:a16="http://schemas.microsoft.com/office/drawing/2014/main" id="{1E0873BC-A716-466C-B144-4F34555413F5}"/>
+              </a:ext>
+            </a:extLst>
+          </p:cNvPr>
+          <p:cNvSpPr/>
+          <p:nvPr/>
+        </p:nvSpPr>
+        <p:spPr>
+          <a:xfrm>
+            <a:off x="4652050" y="3355006"/>
+            <a:ext cx="588316" cy="573339"/>
+          </a:xfrm>
+          <a:prstGeom prst="rect">
+            <a:avLst/>
+          </a:prstGeom>
+          <a:solidFill>
+            <a:schemeClr val="accent6">
+              <a:lumMod val="40000"/>
+              <a:lumOff val="60000"/>
+            </a:schemeClr>
+          </a:solidFill>
+          <a:ln w="28575">
+            <a:solidFill>
+              <a:schemeClr val="accent6">
+                <a:lumMod val="60000"/>
+                <a:lumOff val="40000"/>
+              </a:schemeClr>
+            </a:solidFill>
+            <a:prstDash val="solid"/>
+          </a:ln>
+        </p:spPr>
+        <p:style>
+          <a:lnRef idx="2">
+            <a:schemeClr val="accent1">
+              <a:shade val="50000"/>
+            </a:schemeClr>
+          </a:lnRef>
+          <a:fillRef idx="1">
+            <a:schemeClr val="accent1"/>
+          </a:fillRef>
+          <a:effectRef idx="0">
+            <a:schemeClr val="accent1"/>
+          </a:effectRef>
+          <a:fontRef idx="minor">
+            <a:schemeClr val="lt1"/>
+          </a:fontRef>
+        </p:style>
+        <p:txBody>
+          <a:bodyPr rtlCol="0" anchor="ctr"/>
+          <a:lstStyle/>
+          <a:p>
+            <a:pPr algn="ctr"/>
+            <a:endParaRPr lang="en-CA" sz="1400" b="1" dirty="0">
+              <a:solidFill>
+                <a:schemeClr val="accent5">
+                  <a:lumMod val="75000"/>
+                </a:schemeClr>
+              </a:solidFill>
+            </a:endParaRPr>
+          </a:p>
+        </p:txBody>
+      </p:sp>
+      <p:sp>
+        <p:nvSpPr>
+          <p:cNvPr id="48" name="Rectangle 47">
+            <a:extLst>
+              <a:ext uri="{FF2B5EF4-FFF2-40B4-BE49-F238E27FC236}">
+                <a16:creationId xmlns:a16="http://schemas.microsoft.com/office/drawing/2014/main" id="{FD8CF9A6-E418-49B6-AD92-DD8ED427AA76}"/>
+              </a:ext>
+            </a:extLst>
+          </p:cNvPr>
+          <p:cNvSpPr/>
+          <p:nvPr/>
+        </p:nvSpPr>
+        <p:spPr>
+          <a:xfrm>
+            <a:off x="1907572" y="2211049"/>
+            <a:ext cx="2229265" cy="252653"/>
+          </a:xfrm>
+          <a:prstGeom prst="rect">
+            <a:avLst/>
+          </a:prstGeom>
+          <a:solidFill>
+            <a:schemeClr val="accent6">
+              <a:lumMod val="40000"/>
+              <a:lumOff val="60000"/>
+            </a:schemeClr>
+          </a:solidFill>
+          <a:ln w="28575">
+            <a:solidFill>
+              <a:schemeClr val="accent6">
+                <a:lumMod val="60000"/>
+                <a:lumOff val="40000"/>
+              </a:schemeClr>
+            </a:solidFill>
+            <a:prstDash val="solid"/>
+          </a:ln>
+        </p:spPr>
+        <p:style>
+          <a:lnRef idx="2">
+            <a:schemeClr val="accent1">
+              <a:shade val="50000"/>
+            </a:schemeClr>
+          </a:lnRef>
+          <a:fillRef idx="1">
+            <a:schemeClr val="accent1"/>
+          </a:fillRef>
+          <a:effectRef idx="0">
+            <a:schemeClr val="accent1"/>
+          </a:effectRef>
+          <a:fontRef idx="minor">
+            <a:schemeClr val="lt1"/>
+          </a:fontRef>
+        </p:style>
+        <p:txBody>
+          <a:bodyPr rtlCol="0" anchor="ctr"/>
+          <a:lstStyle/>
+          <a:p>
+            <a:pPr algn="ctr"/>
+            <a:r>
+              <a:rPr lang="en-CA" sz="1400" b="1" dirty="0">
+                <a:solidFill>
+                  <a:schemeClr val="accent5">
+                    <a:lumMod val="75000"/>
+                  </a:schemeClr>
+                </a:solidFill>
+              </a:rPr>
+              <a:t>Interpreter</a:t>
+            </a:r>
+          </a:p>
+        </p:txBody>
+      </p:sp>
+      <p:sp>
+        <p:nvSpPr>
+          <p:cNvPr id="49" name="Rectangle 48">
+            <a:extLst>
+              <a:ext uri="{FF2B5EF4-FFF2-40B4-BE49-F238E27FC236}">
+                <a16:creationId xmlns:a16="http://schemas.microsoft.com/office/drawing/2014/main" id="{D92DA6AE-38AD-4FEF-B41F-327E3B0E96FB}"/>
+              </a:ext>
+            </a:extLst>
+          </p:cNvPr>
+          <p:cNvSpPr/>
+          <p:nvPr/>
+        </p:nvSpPr>
+        <p:spPr>
+          <a:xfrm>
+            <a:off x="4288849" y="1738915"/>
+            <a:ext cx="968240" cy="721815"/>
+          </a:xfrm>
+          <a:prstGeom prst="rect">
+            <a:avLst/>
+          </a:prstGeom>
+          <a:solidFill>
+            <a:schemeClr val="accent6">
+              <a:lumMod val="40000"/>
+              <a:lumOff val="60000"/>
+            </a:schemeClr>
+          </a:solidFill>
+          <a:ln w="28575">
+            <a:solidFill>
+              <a:schemeClr val="accent6">
+                <a:lumMod val="60000"/>
+                <a:lumOff val="40000"/>
+              </a:schemeClr>
+            </a:solidFill>
+            <a:prstDash val="solid"/>
+          </a:ln>
+        </p:spPr>
+        <p:style>
+          <a:lnRef idx="2">
+            <a:schemeClr val="accent1">
+              <a:shade val="50000"/>
+            </a:schemeClr>
+          </a:lnRef>
+          <a:fillRef idx="1">
+            <a:schemeClr val="accent1"/>
+          </a:fillRef>
+          <a:effectRef idx="0">
+            <a:schemeClr val="accent1"/>
+          </a:effectRef>
+          <a:fontRef idx="minor">
+            <a:schemeClr val="lt1"/>
+          </a:fontRef>
+        </p:style>
+        <p:txBody>
+          <a:bodyPr rtlCol="0" anchor="ctr"/>
+          <a:lstStyle/>
+          <a:p>
+            <a:pPr algn="ctr"/>
+            <a:r>
+              <a:rPr lang="en-CA" sz="1400" b="1" dirty="0">
+                <a:solidFill>
+                  <a:schemeClr val="accent5">
+                    <a:lumMod val="75000"/>
+                  </a:schemeClr>
+                </a:solidFill>
+              </a:rPr>
+              <a:t>Function</a:t>
+            </a:r>
+          </a:p>
+          <a:p>
+            <a:pPr algn="ctr"/>
+            <a:r>
+              <a:rPr lang="en-CA" sz="1400" b="1" dirty="0">
+                <a:solidFill>
+                  <a:schemeClr val="accent5">
+                    <a:lumMod val="75000"/>
+                  </a:schemeClr>
+                </a:solidFill>
+              </a:rPr>
+              <a:t>monitor</a:t>
+            </a:r>
+          </a:p>
+        </p:txBody>
+      </p:sp>
+      <p:sp>
+        <p:nvSpPr>
+          <p:cNvPr id="53" name="Rectangle 52">
+            <a:extLst>
+              <a:ext uri="{FF2B5EF4-FFF2-40B4-BE49-F238E27FC236}">
+                <a16:creationId xmlns:a16="http://schemas.microsoft.com/office/drawing/2014/main" id="{4C67B388-8610-47F7-92A3-538DF2D2FC49}"/>
+              </a:ext>
+            </a:extLst>
+          </p:cNvPr>
+          <p:cNvSpPr/>
+          <p:nvPr/>
+        </p:nvSpPr>
+        <p:spPr>
+          <a:xfrm>
+            <a:off x="4670839" y="3252752"/>
+            <a:ext cx="531277" cy="573339"/>
+          </a:xfrm>
+          <a:prstGeom prst="rect">
+            <a:avLst/>
+          </a:prstGeom>
+          <a:solidFill>
+            <a:schemeClr val="accent6">
+              <a:lumMod val="40000"/>
+              <a:lumOff val="60000"/>
+            </a:schemeClr>
+          </a:solidFill>
+          <a:ln w="28575">
+            <a:noFill/>
+            <a:prstDash val="solid"/>
+          </a:ln>
+        </p:spPr>
+        <p:style>
+          <a:lnRef idx="2">
+            <a:schemeClr val="accent1">
+              <a:shade val="50000"/>
+            </a:schemeClr>
+          </a:lnRef>
+          <a:fillRef idx="1">
+            <a:schemeClr val="accent1"/>
+          </a:fillRef>
+          <a:effectRef idx="0">
+            <a:schemeClr val="accent1"/>
+          </a:effectRef>
+          <a:fontRef idx="minor">
+            <a:schemeClr val="lt1"/>
+          </a:fontRef>
+        </p:style>
+        <p:txBody>
+          <a:bodyPr rtlCol="0" anchor="ctr"/>
+          <a:lstStyle/>
+          <a:p>
+            <a:pPr algn="ctr"/>
+            <a:endParaRPr lang="en-CA" sz="1400" b="1" dirty="0">
+              <a:solidFill>
+                <a:schemeClr val="accent5">
+                  <a:lumMod val="75000"/>
+                </a:schemeClr>
+              </a:solidFill>
+            </a:endParaRPr>
+          </a:p>
+        </p:txBody>
+      </p:sp>
+      <p:sp>
+        <p:nvSpPr>
+          <p:cNvPr id="54" name="Isosceles Triangle 53">
+            <a:extLst>
+              <a:ext uri="{FF2B5EF4-FFF2-40B4-BE49-F238E27FC236}">
+                <a16:creationId xmlns:a16="http://schemas.microsoft.com/office/drawing/2014/main" id="{7738DBC6-DD43-4F4F-88E8-69BCAFDFA7F5}"/>
+              </a:ext>
+            </a:extLst>
+          </p:cNvPr>
+          <p:cNvSpPr/>
+          <p:nvPr/>
+        </p:nvSpPr>
+        <p:spPr>
+          <a:xfrm rot="10800000" flipH="1">
+            <a:off x="4669055" y="3167797"/>
+            <a:ext cx="187112" cy="157503"/>
+          </a:xfrm>
+          <a:prstGeom prst="triangle">
+            <a:avLst/>
+          </a:prstGeom>
+        </p:spPr>
+        <p:style>
+          <a:lnRef idx="2">
+            <a:schemeClr val="accent1">
+              <a:shade val="50000"/>
+            </a:schemeClr>
+          </a:lnRef>
+          <a:fillRef idx="1">
+            <a:schemeClr val="accent1"/>
+          </a:fillRef>
+          <a:effectRef idx="0">
+            <a:schemeClr val="accent1"/>
+          </a:effectRef>
+          <a:fontRef idx="minor">
+            <a:schemeClr val="lt1"/>
+          </a:fontRef>
+        </p:style>
+        <p:txBody>
+          <a:bodyPr rtlCol="0" anchor="ctr"/>
+          <a:lstStyle/>
+          <a:p>
+            <a:pPr algn="ctr"/>
+            <a:endParaRPr lang="en-US"/>
+          </a:p>
+        </p:txBody>
+      </p:sp>
+      <p:sp>
+        <p:nvSpPr>
+          <p:cNvPr id="55" name="Oval 54">
+            <a:extLst>
+              <a:ext uri="{FF2B5EF4-FFF2-40B4-BE49-F238E27FC236}">
+                <a16:creationId xmlns:a16="http://schemas.microsoft.com/office/drawing/2014/main" id="{14E374BC-AB50-4792-A9E8-AF60EF2705D2}"/>
+              </a:ext>
+            </a:extLst>
+          </p:cNvPr>
+          <p:cNvSpPr/>
+          <p:nvPr/>
+        </p:nvSpPr>
+        <p:spPr>
+          <a:xfrm flipH="1">
+            <a:off x="4840971" y="3368187"/>
+            <a:ext cx="169102" cy="183488"/>
+          </a:xfrm>
+          <a:prstGeom prst="ellipse">
+            <a:avLst/>
+          </a:prstGeom>
+        </p:spPr>
+        <p:style>
+          <a:lnRef idx="2">
+            <a:schemeClr val="accent1">
+              <a:shade val="50000"/>
+            </a:schemeClr>
+          </a:lnRef>
+          <a:fillRef idx="1">
+            <a:schemeClr val="accent1"/>
+          </a:fillRef>
+          <a:effectRef idx="0">
+            <a:schemeClr val="accent1"/>
+          </a:effectRef>
+          <a:fontRef idx="minor">
+            <a:schemeClr val="lt1"/>
+          </a:fontRef>
+        </p:style>
+        <p:txBody>
+          <a:bodyPr rtlCol="0" anchor="ctr"/>
+          <a:lstStyle/>
+          <a:p>
+            <a:pPr algn="ctr"/>
+            <a:endParaRPr lang="en-US" dirty="0"/>
+          </a:p>
+        </p:txBody>
+      </p:sp>
+      <p:sp>
+        <p:nvSpPr>
+          <p:cNvPr id="56" name="Rectangle: Rounded Corners 55">
+            <a:extLst>
+              <a:ext uri="{FF2B5EF4-FFF2-40B4-BE49-F238E27FC236}">
+                <a16:creationId xmlns:a16="http://schemas.microsoft.com/office/drawing/2014/main" id="{EC17DE6D-DEB8-43B7-8F28-11FF834554BA}"/>
+              </a:ext>
+            </a:extLst>
+          </p:cNvPr>
+          <p:cNvSpPr/>
+          <p:nvPr/>
+        </p:nvSpPr>
+        <p:spPr>
+          <a:xfrm flipH="1">
+            <a:off x="5017167" y="3146898"/>
+            <a:ext cx="169102" cy="183488"/>
+          </a:xfrm>
+          <a:prstGeom prst="roundRect">
+            <a:avLst/>
+          </a:prstGeom>
+        </p:spPr>
+        <p:style>
+          <a:lnRef idx="2">
+            <a:schemeClr val="accent1">
+              <a:shade val="50000"/>
+            </a:schemeClr>
+          </a:lnRef>
+          <a:fillRef idx="1">
+            <a:schemeClr val="accent1"/>
+          </a:fillRef>
+          <a:effectRef idx="0">
+            <a:schemeClr val="accent1"/>
+          </a:effectRef>
+          <a:fontRef idx="minor">
+            <a:schemeClr val="lt1"/>
+          </a:fontRef>
+        </p:style>
+        <p:txBody>
+          <a:bodyPr rtlCol="0" anchor="ctr"/>
+          <a:lstStyle/>
+          <a:p>
+            <a:pPr algn="ctr"/>
+            <a:endParaRPr lang="en-US"/>
+          </a:p>
+        </p:txBody>
+      </p:sp>
     </p:spTree>
     <p:extLst>
       <p:ext uri="{BB962C8B-B14F-4D97-AF65-F5344CB8AC3E}">

</xml_diff>